<commit_message>
Implemented the reaction-based workflow
Added a method to check all human reactions and find significantly
impacted reactions based on cosmic mutations and interactome3d; added a
new slide for doing a gene-based mutation analysis
</commit_message>
<xml_diff>
--- a/docs/Workflow.pptx
+++ b/docs/Workflow.pptx
@@ -6,6 +6,7 @@
   </p:sldMasterIdLst>
   <p:sldIdLst>
     <p:sldId id="256" r:id="rId2"/>
+    <p:sldId id="257" r:id="rId3"/>
   </p:sldIdLst>
   <p:sldSz cx="9144000" cy="13679488"/>
   <p:notesSz cx="6858000" cy="9144000"/>
@@ -304,7 +305,7 @@
           <a:p>
             <a:fld id="{94616608-B8E6-2F45-A6DF-DF8EC907340B}" type="datetimeFigureOut">
               <a:rPr lang="en-US" smtClean="0"/>
-              <a:t>2/24/17</a:t>
+              <a:t>3/1/17</a:t>
             </a:fld>
             <a:endParaRPr lang="en-US"/>
           </a:p>
@@ -474,7 +475,7 @@
           <a:p>
             <a:fld id="{94616608-B8E6-2F45-A6DF-DF8EC907340B}" type="datetimeFigureOut">
               <a:rPr lang="en-US" smtClean="0"/>
-              <a:t>2/24/17</a:t>
+              <a:t>3/1/17</a:t>
             </a:fld>
             <a:endParaRPr lang="en-US"/>
           </a:p>
@@ -654,7 +655,7 @@
           <a:p>
             <a:fld id="{94616608-B8E6-2F45-A6DF-DF8EC907340B}" type="datetimeFigureOut">
               <a:rPr lang="en-US" smtClean="0"/>
-              <a:t>2/24/17</a:t>
+              <a:t>3/1/17</a:t>
             </a:fld>
             <a:endParaRPr lang="en-US"/>
           </a:p>
@@ -824,7 +825,7 @@
           <a:p>
             <a:fld id="{94616608-B8E6-2F45-A6DF-DF8EC907340B}" type="datetimeFigureOut">
               <a:rPr lang="en-US" smtClean="0"/>
-              <a:t>2/24/17</a:t>
+              <a:t>3/1/17</a:t>
             </a:fld>
             <a:endParaRPr lang="en-US"/>
           </a:p>
@@ -1070,7 +1071,7 @@
           <a:p>
             <a:fld id="{94616608-B8E6-2F45-A6DF-DF8EC907340B}" type="datetimeFigureOut">
               <a:rPr lang="en-US" smtClean="0"/>
-              <a:t>2/24/17</a:t>
+              <a:t>3/1/17</a:t>
             </a:fld>
             <a:endParaRPr lang="en-US"/>
           </a:p>
@@ -1358,7 +1359,7 @@
           <a:p>
             <a:fld id="{94616608-B8E6-2F45-A6DF-DF8EC907340B}" type="datetimeFigureOut">
               <a:rPr lang="en-US" smtClean="0"/>
-              <a:t>2/24/17</a:t>
+              <a:t>3/1/17</a:t>
             </a:fld>
             <a:endParaRPr lang="en-US"/>
           </a:p>
@@ -1780,7 +1781,7 @@
           <a:p>
             <a:fld id="{94616608-B8E6-2F45-A6DF-DF8EC907340B}" type="datetimeFigureOut">
               <a:rPr lang="en-US" smtClean="0"/>
-              <a:t>2/24/17</a:t>
+              <a:t>3/1/17</a:t>
             </a:fld>
             <a:endParaRPr lang="en-US"/>
           </a:p>
@@ -1898,7 +1899,7 @@
           <a:p>
             <a:fld id="{94616608-B8E6-2F45-A6DF-DF8EC907340B}" type="datetimeFigureOut">
               <a:rPr lang="en-US" smtClean="0"/>
-              <a:t>2/24/17</a:t>
+              <a:t>3/1/17</a:t>
             </a:fld>
             <a:endParaRPr lang="en-US"/>
           </a:p>
@@ -1993,7 +1994,7 @@
           <a:p>
             <a:fld id="{94616608-B8E6-2F45-A6DF-DF8EC907340B}" type="datetimeFigureOut">
               <a:rPr lang="en-US" smtClean="0"/>
-              <a:t>2/24/17</a:t>
+              <a:t>3/1/17</a:t>
             </a:fld>
             <a:endParaRPr lang="en-US"/>
           </a:p>
@@ -2270,7 +2271,7 @@
           <a:p>
             <a:fld id="{94616608-B8E6-2F45-A6DF-DF8EC907340B}" type="datetimeFigureOut">
               <a:rPr lang="en-US" smtClean="0"/>
-              <a:t>2/24/17</a:t>
+              <a:t>3/1/17</a:t>
             </a:fld>
             <a:endParaRPr lang="en-US"/>
           </a:p>
@@ -2523,7 +2524,7 @@
           <a:p>
             <a:fld id="{94616608-B8E6-2F45-A6DF-DF8EC907340B}" type="datetimeFigureOut">
               <a:rPr lang="en-US" smtClean="0"/>
-              <a:t>2/24/17</a:t>
+              <a:t>3/1/17</a:t>
             </a:fld>
             <a:endParaRPr lang="en-US"/>
           </a:p>
@@ -2736,7 +2737,7 @@
           <a:p>
             <a:fld id="{94616608-B8E6-2F45-A6DF-DF8EC907340B}" type="datetimeFigureOut">
               <a:rPr lang="en-US" smtClean="0"/>
-              <a:t>2/24/17</a:t>
+              <a:t>3/1/17</a:t>
             </a:fld>
             <a:endParaRPr lang="en-US"/>
           </a:p>
@@ -3119,7 +3120,7 @@
         </p:nvSpPr>
         <p:spPr>
           <a:xfrm>
-            <a:off x="1554900" y="791536"/>
+            <a:off x="1554900" y="1487574"/>
             <a:ext cx="1928836" cy="646331"/>
           </a:xfrm>
           <a:prstGeom prst="rect">
@@ -3163,7 +3164,7 @@
         </p:nvSpPr>
         <p:spPr>
           <a:xfrm>
-            <a:off x="5640198" y="791536"/>
+            <a:off x="5640198" y="1487574"/>
             <a:ext cx="1928836" cy="646331"/>
           </a:xfrm>
           <a:prstGeom prst="rect">
@@ -3211,7 +3212,7 @@
         </p:nvSpPr>
         <p:spPr>
           <a:xfrm>
-            <a:off x="3483736" y="2003217"/>
+            <a:off x="3483736" y="2699255"/>
             <a:ext cx="1928836" cy="646331"/>
           </a:xfrm>
           <a:prstGeom prst="rect">
@@ -3258,7 +3259,7 @@
         </p:nvCxnSpPr>
         <p:spPr>
           <a:xfrm>
-            <a:off x="3483736" y="1114702"/>
+            <a:off x="3483736" y="1810740"/>
             <a:ext cx="964418" cy="888515"/>
           </a:xfrm>
           <a:prstGeom prst="bentConnector2">
@@ -3294,7 +3295,7 @@
         </p:nvCxnSpPr>
         <p:spPr>
           <a:xfrm rot="10800000" flipV="1">
-            <a:off x="4448154" y="1114701"/>
+            <a:off x="4448154" y="1810739"/>
             <a:ext cx="1192044" cy="888515"/>
           </a:xfrm>
           <a:prstGeom prst="bentConnector2">
@@ -3327,7 +3328,7 @@
         </p:nvSpPr>
         <p:spPr>
           <a:xfrm>
-            <a:off x="4265806" y="1286784"/>
+            <a:off x="4265806" y="1982822"/>
             <a:ext cx="1569426" cy="646331"/>
           </a:xfrm>
           <a:prstGeom prst="rect">
@@ -3358,7 +3359,7 @@
         </p:nvSpPr>
         <p:spPr>
           <a:xfrm>
-            <a:off x="1554900" y="3557676"/>
+            <a:off x="1554900" y="4253714"/>
             <a:ext cx="1928836" cy="646331"/>
           </a:xfrm>
           <a:prstGeom prst="rect">
@@ -3402,7 +3403,7 @@
         </p:nvSpPr>
         <p:spPr>
           <a:xfrm>
-            <a:off x="5640198" y="3557676"/>
+            <a:off x="5640198" y="4253714"/>
             <a:ext cx="1928836" cy="646331"/>
           </a:xfrm>
           <a:prstGeom prst="rect">
@@ -3449,7 +3450,7 @@
         </p:nvCxnSpPr>
         <p:spPr>
           <a:xfrm rot="5400000">
-            <a:off x="3029672" y="2139194"/>
+            <a:off x="3029672" y="2835232"/>
             <a:ext cx="908128" cy="1928836"/>
           </a:xfrm>
           <a:prstGeom prst="bentConnector3">
@@ -3485,7 +3486,7 @@
         </p:nvCxnSpPr>
         <p:spPr>
           <a:xfrm rot="16200000" flipH="1">
-            <a:off x="5072321" y="2025381"/>
+            <a:off x="5072321" y="2721419"/>
             <a:ext cx="908128" cy="2156462"/>
           </a:xfrm>
           <a:prstGeom prst="bentConnector3">
@@ -3518,7 +3519,7 @@
         </p:nvSpPr>
         <p:spPr>
           <a:xfrm>
-            <a:off x="4050029" y="2672618"/>
+            <a:off x="4050029" y="3368656"/>
             <a:ext cx="1569426" cy="369332"/>
           </a:xfrm>
           <a:prstGeom prst="rect">
@@ -3549,7 +3550,7 @@
         </p:nvSpPr>
         <p:spPr>
           <a:xfrm>
-            <a:off x="3483737" y="5582547"/>
+            <a:off x="3483737" y="6278585"/>
             <a:ext cx="1928836" cy="646331"/>
           </a:xfrm>
           <a:prstGeom prst="rect">
@@ -3596,7 +3597,7 @@
         </p:nvCxnSpPr>
         <p:spPr>
           <a:xfrm rot="16200000" flipH="1">
-            <a:off x="2794466" y="3928858"/>
+            <a:off x="2794466" y="4624896"/>
             <a:ext cx="1378540" cy="1928837"/>
           </a:xfrm>
           <a:prstGeom prst="bentConnector3">
@@ -3634,7 +3635,7 @@
         </p:nvCxnSpPr>
         <p:spPr>
           <a:xfrm rot="5400000">
-            <a:off x="4837116" y="3815047"/>
+            <a:off x="4837116" y="4511085"/>
             <a:ext cx="1378540" cy="2156461"/>
           </a:xfrm>
           <a:prstGeom prst="bentConnector3">
@@ -3669,7 +3670,7 @@
         </p:nvSpPr>
         <p:spPr>
           <a:xfrm>
-            <a:off x="4448154" y="4988712"/>
+            <a:off x="4448154" y="5684750"/>
             <a:ext cx="2659702" cy="369332"/>
           </a:xfrm>
           <a:prstGeom prst="rect">
@@ -3699,7 +3700,7 @@
         </p:nvSpPr>
         <p:spPr>
           <a:xfrm>
-            <a:off x="3483738" y="6616920"/>
+            <a:off x="3483738" y="7312958"/>
             <a:ext cx="1928836" cy="646331"/>
           </a:xfrm>
           <a:prstGeom prst="rect">
@@ -3743,7 +3744,7 @@
         </p:nvSpPr>
         <p:spPr>
           <a:xfrm>
-            <a:off x="3483738" y="7668933"/>
+            <a:off x="3483738" y="8364971"/>
             <a:ext cx="1928836" cy="646331"/>
           </a:xfrm>
           <a:prstGeom prst="rect">
@@ -3790,7 +3791,7 @@
         </p:nvCxnSpPr>
         <p:spPr>
           <a:xfrm>
-            <a:off x="4448155" y="6228878"/>
+            <a:off x="4448155" y="6924916"/>
             <a:ext cx="1" cy="388042"/>
           </a:xfrm>
           <a:prstGeom prst="straightConnector1">
@@ -3826,7 +3827,7 @@
         </p:nvCxnSpPr>
         <p:spPr>
           <a:xfrm>
-            <a:off x="4448156" y="7263251"/>
+            <a:off x="4448156" y="7959289"/>
             <a:ext cx="0" cy="405682"/>
           </a:xfrm>
           <a:prstGeom prst="straightConnector1">
@@ -3859,7 +3860,7 @@
         </p:nvSpPr>
         <p:spPr>
           <a:xfrm>
-            <a:off x="172643" y="4950186"/>
+            <a:off x="172643" y="5646224"/>
             <a:ext cx="1928836" cy="646331"/>
           </a:xfrm>
           <a:prstGeom prst="rect">
@@ -3906,7 +3907,7 @@
         </p:nvCxnSpPr>
         <p:spPr>
           <a:xfrm flipV="1">
-            <a:off x="2101479" y="4204007"/>
+            <a:off x="2101479" y="4900045"/>
             <a:ext cx="417839" cy="1069345"/>
           </a:xfrm>
           <a:prstGeom prst="bentConnector2">
@@ -3936,7 +3937,7 @@
         </p:nvSpPr>
         <p:spPr>
           <a:xfrm>
-            <a:off x="7569034" y="4943665"/>
+            <a:off x="7569034" y="5639703"/>
             <a:ext cx="1467658" cy="369332"/>
           </a:xfrm>
           <a:prstGeom prst="rect">
@@ -3983,7 +3984,7 @@
         </p:nvCxnSpPr>
         <p:spPr>
           <a:xfrm rot="16200000" flipV="1">
-            <a:off x="7083911" y="3724712"/>
+            <a:off x="7083911" y="4420750"/>
             <a:ext cx="739658" cy="1698247"/>
           </a:xfrm>
           <a:prstGeom prst="bentConnector3">
@@ -4015,7 +4016,7 @@
         </p:nvSpPr>
         <p:spPr>
           <a:xfrm>
-            <a:off x="6604616" y="5799997"/>
+            <a:off x="6604616" y="6496035"/>
             <a:ext cx="1928836" cy="369332"/>
           </a:xfrm>
           <a:prstGeom prst="rect">
@@ -4059,7 +4060,7 @@
         </p:nvSpPr>
         <p:spPr>
           <a:xfrm>
-            <a:off x="6604616" y="6948327"/>
+            <a:off x="6604616" y="7644365"/>
             <a:ext cx="1928836" cy="646331"/>
           </a:xfrm>
           <a:prstGeom prst="rect">
@@ -4107,7 +4108,7 @@
         </p:nvSpPr>
         <p:spPr>
           <a:xfrm>
-            <a:off x="1218741" y="9110410"/>
+            <a:off x="1218741" y="9806448"/>
             <a:ext cx="2434284" cy="646331"/>
           </a:xfrm>
           <a:prstGeom prst="rect">
@@ -4137,11 +4138,7 @@
             <a:pPr algn="ctr"/>
             <a:r>
               <a:rPr lang="en-US" dirty="0" smtClean="0"/>
-              <a:t>Common impacted </a:t>
-            </a:r>
-            <a:r>
-              <a:rPr lang="en-US" dirty="0" smtClean="0"/>
-              <a:t>pathways in cancers</a:t>
+              <a:t>Common impacted pathways in cancers</a:t>
             </a:r>
             <a:endParaRPr lang="en-US" dirty="0"/>
           </a:p>
@@ -4155,7 +4152,7 @@
         </p:nvSpPr>
         <p:spPr>
           <a:xfrm>
-            <a:off x="5619455" y="8977486"/>
+            <a:off x="5619455" y="9673524"/>
             <a:ext cx="2434284" cy="923330"/>
           </a:xfrm>
           <a:prstGeom prst="rect">
@@ -4185,11 +4182,7 @@
             <a:pPr algn="ctr"/>
             <a:r>
               <a:rPr lang="en-US" dirty="0" smtClean="0"/>
-              <a:t>Different impacted pathways </a:t>
-            </a:r>
-            <a:r>
-              <a:rPr lang="en-US" dirty="0" smtClean="0"/>
-              <a:t>in different cancers</a:t>
+              <a:t>Different impacted pathways in different cancers</a:t>
             </a:r>
             <a:endParaRPr lang="en-US" dirty="0"/>
           </a:p>
@@ -4206,7 +4199,7 @@
         </p:nvCxnSpPr>
         <p:spPr>
           <a:xfrm rot="5400000">
-            <a:off x="3044447" y="7706701"/>
+            <a:off x="3044447" y="8402739"/>
             <a:ext cx="795146" cy="2012273"/>
           </a:xfrm>
           <a:prstGeom prst="bentConnector3">
@@ -4241,7 +4234,7 @@
         </p:nvSpPr>
         <p:spPr>
           <a:xfrm>
-            <a:off x="4443548" y="8343370"/>
+            <a:off x="4443548" y="9039408"/>
             <a:ext cx="1226361" cy="369332"/>
           </a:xfrm>
           <a:prstGeom prst="rect">
@@ -4271,7 +4264,7 @@
         </p:nvSpPr>
         <p:spPr>
           <a:xfrm>
-            <a:off x="209442" y="10063863"/>
+            <a:off x="209442" y="10759901"/>
             <a:ext cx="8666557" cy="2585323"/>
           </a:xfrm>
           <a:prstGeom prst="rect">
@@ -4329,7 +4322,7 @@
         </p:nvSpPr>
         <p:spPr>
           <a:xfrm>
-            <a:off x="171342" y="5877929"/>
+            <a:off x="171342" y="6573967"/>
             <a:ext cx="1928836" cy="923330"/>
           </a:xfrm>
           <a:prstGeom prst="rect">
@@ -4375,7 +4368,7 @@
         </p:nvCxnSpPr>
         <p:spPr>
           <a:xfrm flipV="1">
-            <a:off x="2100178" y="5173378"/>
+            <a:off x="2100178" y="5869416"/>
             <a:ext cx="419137" cy="1166216"/>
           </a:xfrm>
           <a:prstGeom prst="bentConnector2">
@@ -4408,7 +4401,7 @@
         </p:nvCxnSpPr>
         <p:spPr>
           <a:xfrm rot="10800000">
-            <a:off x="5412574" y="5905713"/>
+            <a:off x="5412574" y="6601751"/>
             <a:ext cx="1192043" cy="78950"/>
           </a:xfrm>
           <a:prstGeom prst="bentConnector3">
@@ -4444,7 +4437,7 @@
         </p:nvCxnSpPr>
         <p:spPr>
           <a:xfrm rot="10800000">
-            <a:off x="5412574" y="5905713"/>
+            <a:off x="5412574" y="6601751"/>
             <a:ext cx="1192043" cy="1365780"/>
           </a:xfrm>
           <a:prstGeom prst="bentConnector3">
@@ -4480,7 +4473,7 @@
         </p:nvCxnSpPr>
         <p:spPr>
           <a:xfrm rot="16200000" flipH="1">
-            <a:off x="5311265" y="7452154"/>
+            <a:off x="5311265" y="8148192"/>
             <a:ext cx="662222" cy="2388441"/>
           </a:xfrm>
           <a:prstGeom prst="bentConnector3">
@@ -4507,6 +4500,37 @@
           </a:fontRef>
         </p:style>
       </p:cxnSp>
+      <p:sp>
+        <p:nvSpPr>
+          <p:cNvPr id="2" name="TextBox 1"/>
+          <p:cNvSpPr txBox="1"/>
+          <p:nvPr/>
+        </p:nvSpPr>
+        <p:spPr>
+          <a:xfrm>
+            <a:off x="1367573" y="256192"/>
+            <a:ext cx="6350293" cy="553998"/>
+          </a:xfrm>
+          <a:prstGeom prst="rect">
+            <a:avLst/>
+          </a:prstGeom>
+          <a:noFill/>
+        </p:spPr>
+        <p:txBody>
+          <a:bodyPr wrap="square" rtlCol="0">
+            <a:spAutoFit/>
+          </a:bodyPr>
+          <a:lstStyle/>
+          <a:p>
+            <a:pPr algn="ctr"/>
+            <a:r>
+              <a:rPr lang="en-US" sz="3000" b="1" u="sng" dirty="0" smtClean="0"/>
+              <a:t>Reaction-based Analysis Workflow</a:t>
+            </a:r>
+            <a:endParaRPr lang="en-US" sz="3000" b="1" u="sng" dirty="0"/>
+          </a:p>
+        </p:txBody>
+      </p:sp>
     </p:spTree>
     <p:extLst>
       <p:ext uri="{BB962C8B-B14F-4D97-AF65-F5344CB8AC3E}">
@@ -4524,6 +4548,1170 @@
       </p:par>
     </p:tnLst>
   </p:timing>
+</p:sld>
+</file>
+
+<file path=ppt/slides/slide2.xml><?xml version="1.0" encoding="utf-8"?>
+<p:sld xmlns:a="http://schemas.openxmlformats.org/drawingml/2006/main" xmlns:r="http://schemas.openxmlformats.org/officeDocument/2006/relationships" xmlns:p="http://schemas.openxmlformats.org/presentationml/2006/main">
+  <p:cSld>
+    <p:spTree>
+      <p:nvGrpSpPr>
+        <p:cNvPr id="1" name=""/>
+        <p:cNvGrpSpPr/>
+        <p:nvPr/>
+      </p:nvGrpSpPr>
+      <p:grpSpPr>
+        <a:xfrm>
+          <a:off x="0" y="0"/>
+          <a:ext cx="0" cy="0"/>
+          <a:chOff x="0" y="0"/>
+          <a:chExt cx="0" cy="0"/>
+        </a:xfrm>
+      </p:grpSpPr>
+      <p:sp>
+        <p:nvSpPr>
+          <p:cNvPr id="4" name="TextBox 3"/>
+          <p:cNvSpPr txBox="1"/>
+          <p:nvPr/>
+        </p:nvSpPr>
+        <p:spPr>
+          <a:xfrm>
+            <a:off x="1367573" y="256192"/>
+            <a:ext cx="6350293" cy="553998"/>
+          </a:xfrm>
+          <a:prstGeom prst="rect">
+            <a:avLst/>
+          </a:prstGeom>
+          <a:noFill/>
+        </p:spPr>
+        <p:txBody>
+          <a:bodyPr wrap="square" rtlCol="0">
+            <a:spAutoFit/>
+          </a:bodyPr>
+          <a:lstStyle/>
+          <a:p>
+            <a:pPr algn="ctr"/>
+            <a:r>
+              <a:rPr lang="en-US" sz="3000" b="1" u="sng" dirty="0" smtClean="0"/>
+              <a:t>Gene-based Analysis Workflow</a:t>
+            </a:r>
+            <a:endParaRPr lang="en-US" sz="3000" b="1" u="sng" dirty="0"/>
+          </a:p>
+        </p:txBody>
+      </p:sp>
+      <p:sp>
+        <p:nvSpPr>
+          <p:cNvPr id="5" name="TextBox 4"/>
+          <p:cNvSpPr txBox="1"/>
+          <p:nvPr/>
+        </p:nvSpPr>
+        <p:spPr>
+          <a:xfrm>
+            <a:off x="3578301" y="2362297"/>
+            <a:ext cx="1928836" cy="646331"/>
+          </a:xfrm>
+          <a:prstGeom prst="rect">
+            <a:avLst/>
+          </a:prstGeom>
+        </p:spPr>
+        <p:style>
+          <a:lnRef idx="2">
+            <a:schemeClr val="accent1"/>
+          </a:lnRef>
+          <a:fillRef idx="1">
+            <a:schemeClr val="lt1"/>
+          </a:fillRef>
+          <a:effectRef idx="0">
+            <a:schemeClr val="accent1"/>
+          </a:effectRef>
+          <a:fontRef idx="minor">
+            <a:schemeClr val="dk1"/>
+          </a:fontRef>
+        </p:style>
+        <p:txBody>
+          <a:bodyPr wrap="square" rtlCol="0">
+            <a:spAutoFit/>
+          </a:bodyPr>
+          <a:lstStyle/>
+          <a:p>
+            <a:pPr algn="ctr"/>
+            <a:r>
+              <a:rPr lang="en-US" dirty="0" smtClean="0"/>
+              <a:t>Mutations in </a:t>
+            </a:r>
+            <a:r>
+              <a:rPr lang="en-US" dirty="0" smtClean="0"/>
+              <a:t>Genes</a:t>
+            </a:r>
+            <a:endParaRPr lang="en-US" dirty="0"/>
+          </a:p>
+        </p:txBody>
+      </p:sp>
+      <p:sp>
+        <p:nvSpPr>
+          <p:cNvPr id="6" name="TextBox 5"/>
+          <p:cNvSpPr txBox="1"/>
+          <p:nvPr/>
+        </p:nvSpPr>
+        <p:spPr>
+          <a:xfrm>
+            <a:off x="2036176" y="1272112"/>
+            <a:ext cx="1928836" cy="369332"/>
+          </a:xfrm>
+          <a:prstGeom prst="rect">
+            <a:avLst/>
+          </a:prstGeom>
+        </p:spPr>
+        <p:style>
+          <a:lnRef idx="2">
+            <a:schemeClr val="accent1"/>
+          </a:lnRef>
+          <a:fillRef idx="1">
+            <a:schemeClr val="lt1"/>
+          </a:fillRef>
+          <a:effectRef idx="0">
+            <a:schemeClr val="accent1"/>
+          </a:effectRef>
+          <a:fontRef idx="minor">
+            <a:schemeClr val="dk1"/>
+          </a:fontRef>
+        </p:style>
+        <p:txBody>
+          <a:bodyPr wrap="square" rtlCol="0">
+            <a:spAutoFit/>
+          </a:bodyPr>
+          <a:lstStyle/>
+          <a:p>
+            <a:pPr algn="ctr"/>
+            <a:r>
+              <a:rPr lang="en-US" dirty="0" smtClean="0"/>
+              <a:t>COSMIC</a:t>
+            </a:r>
+            <a:endParaRPr lang="en-US" dirty="0"/>
+          </a:p>
+        </p:txBody>
+      </p:sp>
+      <p:sp>
+        <p:nvSpPr>
+          <p:cNvPr id="7" name="TextBox 6"/>
+          <p:cNvSpPr txBox="1"/>
+          <p:nvPr/>
+        </p:nvSpPr>
+        <p:spPr>
+          <a:xfrm>
+            <a:off x="5417261" y="1119089"/>
+            <a:ext cx="1928836" cy="646331"/>
+          </a:xfrm>
+          <a:prstGeom prst="rect">
+            <a:avLst/>
+          </a:prstGeom>
+        </p:spPr>
+        <p:style>
+          <a:lnRef idx="2">
+            <a:schemeClr val="accent1"/>
+          </a:lnRef>
+          <a:fillRef idx="1">
+            <a:schemeClr val="lt1"/>
+          </a:fillRef>
+          <a:effectRef idx="0">
+            <a:schemeClr val="accent1"/>
+          </a:effectRef>
+          <a:fontRef idx="minor">
+            <a:schemeClr val="dk1"/>
+          </a:fontRef>
+        </p:style>
+        <p:txBody>
+          <a:bodyPr wrap="square" rtlCol="0">
+            <a:spAutoFit/>
+          </a:bodyPr>
+          <a:lstStyle/>
+          <a:p>
+            <a:pPr algn="ctr"/>
+            <a:r>
+              <a:rPr lang="en-US" dirty="0" smtClean="0"/>
+              <a:t>TCGA/ICGC </a:t>
+            </a:r>
+            <a:r>
+              <a:rPr lang="en-US" dirty="0" err="1" smtClean="0"/>
+              <a:t>PanCancer</a:t>
+            </a:r>
+            <a:endParaRPr lang="en-US" dirty="0"/>
+          </a:p>
+        </p:txBody>
+      </p:sp>
+      <p:cxnSp>
+        <p:nvCxnSpPr>
+          <p:cNvPr id="8" name="Elbow Connector 7"/>
+          <p:cNvCxnSpPr>
+            <a:stCxn id="6" idx="2"/>
+            <a:endCxn id="5" idx="0"/>
+          </p:cNvCxnSpPr>
+          <p:nvPr/>
+        </p:nvCxnSpPr>
+        <p:spPr>
+          <a:xfrm rot="16200000" flipH="1">
+            <a:off x="3411230" y="1230807"/>
+            <a:ext cx="720853" cy="1542125"/>
+          </a:xfrm>
+          <a:prstGeom prst="bentConnector3">
+            <a:avLst>
+              <a:gd name="adj1" fmla="val 50000"/>
+            </a:avLst>
+          </a:prstGeom>
+          <a:ln>
+            <a:tailEnd type="triangle"/>
+          </a:ln>
+        </p:spPr>
+        <p:style>
+          <a:lnRef idx="2">
+            <a:schemeClr val="accent1"/>
+          </a:lnRef>
+          <a:fillRef idx="0">
+            <a:schemeClr val="accent1"/>
+          </a:fillRef>
+          <a:effectRef idx="1">
+            <a:schemeClr val="accent1"/>
+          </a:effectRef>
+          <a:fontRef idx="minor">
+            <a:schemeClr val="tx1"/>
+          </a:fontRef>
+        </p:style>
+      </p:cxnSp>
+      <p:cxnSp>
+        <p:nvCxnSpPr>
+          <p:cNvPr id="9" name="Elbow Connector 8"/>
+          <p:cNvCxnSpPr>
+            <a:stCxn id="7" idx="2"/>
+            <a:endCxn id="5" idx="0"/>
+          </p:cNvCxnSpPr>
+          <p:nvPr/>
+        </p:nvCxnSpPr>
+        <p:spPr>
+          <a:xfrm rot="5400000">
+            <a:off x="5163761" y="1144378"/>
+            <a:ext cx="596877" cy="1838960"/>
+          </a:xfrm>
+          <a:prstGeom prst="bentConnector3">
+            <a:avLst>
+              <a:gd name="adj1" fmla="val 38567"/>
+            </a:avLst>
+          </a:prstGeom>
+          <a:ln>
+            <a:tailEnd type="triangle"/>
+          </a:ln>
+        </p:spPr>
+        <p:style>
+          <a:lnRef idx="2">
+            <a:schemeClr val="accent1"/>
+          </a:lnRef>
+          <a:fillRef idx="0">
+            <a:schemeClr val="accent1"/>
+          </a:fillRef>
+          <a:effectRef idx="1">
+            <a:schemeClr val="accent1"/>
+          </a:effectRef>
+          <a:fontRef idx="minor">
+            <a:schemeClr val="tx1"/>
+          </a:fontRef>
+        </p:style>
+      </p:cxnSp>
+      <p:sp>
+        <p:nvSpPr>
+          <p:cNvPr id="18" name="TextBox 17"/>
+          <p:cNvSpPr txBox="1"/>
+          <p:nvPr/>
+        </p:nvSpPr>
+        <p:spPr>
+          <a:xfrm>
+            <a:off x="3578301" y="5461605"/>
+            <a:ext cx="1928836" cy="646331"/>
+          </a:xfrm>
+          <a:prstGeom prst="rect">
+            <a:avLst/>
+          </a:prstGeom>
+        </p:spPr>
+        <p:style>
+          <a:lnRef idx="2">
+            <a:schemeClr val="accent1"/>
+          </a:lnRef>
+          <a:fillRef idx="1">
+            <a:schemeClr val="lt1"/>
+          </a:fillRef>
+          <a:effectRef idx="0">
+            <a:schemeClr val="accent1"/>
+          </a:effectRef>
+          <a:fontRef idx="minor">
+            <a:schemeClr val="dk1"/>
+          </a:fontRef>
+        </p:style>
+        <p:txBody>
+          <a:bodyPr wrap="square" rtlCol="0">
+            <a:spAutoFit/>
+          </a:bodyPr>
+          <a:lstStyle/>
+          <a:p>
+            <a:pPr algn="ctr"/>
+            <a:r>
+              <a:rPr lang="en-US" dirty="0" smtClean="0"/>
+              <a:t>Mutations in interfaces</a:t>
+            </a:r>
+            <a:endParaRPr lang="en-US" dirty="0"/>
+          </a:p>
+        </p:txBody>
+      </p:sp>
+      <p:sp>
+        <p:nvSpPr>
+          <p:cNvPr id="19" name="TextBox 18"/>
+          <p:cNvSpPr txBox="1"/>
+          <p:nvPr/>
+        </p:nvSpPr>
+        <p:spPr>
+          <a:xfrm>
+            <a:off x="3578302" y="6495978"/>
+            <a:ext cx="1928836" cy="646331"/>
+          </a:xfrm>
+          <a:prstGeom prst="rect">
+            <a:avLst/>
+          </a:prstGeom>
+        </p:spPr>
+        <p:style>
+          <a:lnRef idx="2">
+            <a:schemeClr val="accent1"/>
+          </a:lnRef>
+          <a:fillRef idx="1">
+            <a:schemeClr val="lt1"/>
+          </a:fillRef>
+          <a:effectRef idx="0">
+            <a:schemeClr val="accent1"/>
+          </a:effectRef>
+          <a:fontRef idx="minor">
+            <a:schemeClr val="dk1"/>
+          </a:fontRef>
+        </p:style>
+        <p:txBody>
+          <a:bodyPr wrap="square" rtlCol="0">
+            <a:spAutoFit/>
+          </a:bodyPr>
+          <a:lstStyle/>
+          <a:p>
+            <a:pPr algn="ctr"/>
+            <a:r>
+              <a:rPr lang="en-US" dirty="0" smtClean="0"/>
+              <a:t>Impacted reactions</a:t>
+            </a:r>
+            <a:endParaRPr lang="en-US" dirty="0"/>
+          </a:p>
+        </p:txBody>
+      </p:sp>
+      <p:sp>
+        <p:nvSpPr>
+          <p:cNvPr id="20" name="TextBox 19"/>
+          <p:cNvSpPr txBox="1"/>
+          <p:nvPr/>
+        </p:nvSpPr>
+        <p:spPr>
+          <a:xfrm>
+            <a:off x="3578302" y="7547991"/>
+            <a:ext cx="1928836" cy="646331"/>
+          </a:xfrm>
+          <a:prstGeom prst="rect">
+            <a:avLst/>
+          </a:prstGeom>
+        </p:spPr>
+        <p:style>
+          <a:lnRef idx="2">
+            <a:schemeClr val="accent1"/>
+          </a:lnRef>
+          <a:fillRef idx="1">
+            <a:schemeClr val="lt1"/>
+          </a:fillRef>
+          <a:effectRef idx="0">
+            <a:schemeClr val="accent1"/>
+          </a:effectRef>
+          <a:fontRef idx="minor">
+            <a:schemeClr val="dk1"/>
+          </a:fontRef>
+        </p:style>
+        <p:txBody>
+          <a:bodyPr wrap="square" rtlCol="0">
+            <a:spAutoFit/>
+          </a:bodyPr>
+          <a:lstStyle/>
+          <a:p>
+            <a:pPr algn="ctr"/>
+            <a:r>
+              <a:rPr lang="en-US" dirty="0" smtClean="0"/>
+              <a:t>Impacted pathways</a:t>
+            </a:r>
+            <a:endParaRPr lang="en-US" dirty="0"/>
+          </a:p>
+        </p:txBody>
+      </p:sp>
+      <p:cxnSp>
+        <p:nvCxnSpPr>
+          <p:cNvPr id="21" name="Straight Arrow Connector 20"/>
+          <p:cNvCxnSpPr/>
+          <p:nvPr/>
+        </p:nvCxnSpPr>
+        <p:spPr>
+          <a:xfrm>
+            <a:off x="4542719" y="6107936"/>
+            <a:ext cx="1" cy="388042"/>
+          </a:xfrm>
+          <a:prstGeom prst="straightConnector1">
+            <a:avLst/>
+          </a:prstGeom>
+          <a:ln>
+            <a:tailEnd type="arrow"/>
+          </a:ln>
+        </p:spPr>
+        <p:style>
+          <a:lnRef idx="2">
+            <a:schemeClr val="accent1"/>
+          </a:lnRef>
+          <a:fillRef idx="0">
+            <a:schemeClr val="accent1"/>
+          </a:fillRef>
+          <a:effectRef idx="1">
+            <a:schemeClr val="accent1"/>
+          </a:effectRef>
+          <a:fontRef idx="minor">
+            <a:schemeClr val="tx1"/>
+          </a:fontRef>
+        </p:style>
+      </p:cxnSp>
+      <p:cxnSp>
+        <p:nvCxnSpPr>
+          <p:cNvPr id="22" name="Straight Arrow Connector 21"/>
+          <p:cNvCxnSpPr/>
+          <p:nvPr/>
+        </p:nvCxnSpPr>
+        <p:spPr>
+          <a:xfrm>
+            <a:off x="4542720" y="7142309"/>
+            <a:ext cx="0" cy="405682"/>
+          </a:xfrm>
+          <a:prstGeom prst="straightConnector1">
+            <a:avLst/>
+          </a:prstGeom>
+          <a:ln>
+            <a:tailEnd type="arrow"/>
+          </a:ln>
+        </p:spPr>
+        <p:style>
+          <a:lnRef idx="2">
+            <a:schemeClr val="accent1"/>
+          </a:lnRef>
+          <a:fillRef idx="0">
+            <a:schemeClr val="accent1"/>
+          </a:fillRef>
+          <a:effectRef idx="1">
+            <a:schemeClr val="accent1"/>
+          </a:effectRef>
+          <a:fontRef idx="minor">
+            <a:schemeClr val="tx1"/>
+          </a:fontRef>
+        </p:style>
+      </p:cxnSp>
+      <p:sp>
+        <p:nvSpPr>
+          <p:cNvPr id="23" name="TextBox 22"/>
+          <p:cNvSpPr txBox="1"/>
+          <p:nvPr/>
+        </p:nvSpPr>
+        <p:spPr>
+          <a:xfrm>
+            <a:off x="1313305" y="8989468"/>
+            <a:ext cx="2434284" cy="646331"/>
+          </a:xfrm>
+          <a:prstGeom prst="rect">
+            <a:avLst/>
+          </a:prstGeom>
+        </p:spPr>
+        <p:style>
+          <a:lnRef idx="2">
+            <a:schemeClr val="accent1"/>
+          </a:lnRef>
+          <a:fillRef idx="1">
+            <a:schemeClr val="lt1"/>
+          </a:fillRef>
+          <a:effectRef idx="0">
+            <a:schemeClr val="accent1"/>
+          </a:effectRef>
+          <a:fontRef idx="minor">
+            <a:schemeClr val="dk1"/>
+          </a:fontRef>
+        </p:style>
+        <p:txBody>
+          <a:bodyPr wrap="square" rtlCol="0">
+            <a:spAutoFit/>
+          </a:bodyPr>
+          <a:lstStyle/>
+          <a:p>
+            <a:pPr algn="ctr"/>
+            <a:r>
+              <a:rPr lang="en-US" dirty="0" smtClean="0"/>
+              <a:t>Common impacted pathways in cancers</a:t>
+            </a:r>
+            <a:endParaRPr lang="en-US" dirty="0"/>
+          </a:p>
+        </p:txBody>
+      </p:sp>
+      <p:sp>
+        <p:nvSpPr>
+          <p:cNvPr id="24" name="TextBox 23"/>
+          <p:cNvSpPr txBox="1"/>
+          <p:nvPr/>
+        </p:nvSpPr>
+        <p:spPr>
+          <a:xfrm>
+            <a:off x="5714019" y="8856544"/>
+            <a:ext cx="2434284" cy="923330"/>
+          </a:xfrm>
+          <a:prstGeom prst="rect">
+            <a:avLst/>
+          </a:prstGeom>
+        </p:spPr>
+        <p:style>
+          <a:lnRef idx="2">
+            <a:schemeClr val="accent1"/>
+          </a:lnRef>
+          <a:fillRef idx="1">
+            <a:schemeClr val="lt1"/>
+          </a:fillRef>
+          <a:effectRef idx="0">
+            <a:schemeClr val="accent1"/>
+          </a:effectRef>
+          <a:fontRef idx="minor">
+            <a:schemeClr val="dk1"/>
+          </a:fontRef>
+        </p:style>
+        <p:txBody>
+          <a:bodyPr wrap="square" rtlCol="0">
+            <a:spAutoFit/>
+          </a:bodyPr>
+          <a:lstStyle/>
+          <a:p>
+            <a:pPr algn="ctr"/>
+            <a:r>
+              <a:rPr lang="en-US" dirty="0" smtClean="0"/>
+              <a:t>Different impacted pathways in different cancers</a:t>
+            </a:r>
+            <a:endParaRPr lang="en-US" dirty="0"/>
+          </a:p>
+        </p:txBody>
+      </p:sp>
+      <p:cxnSp>
+        <p:nvCxnSpPr>
+          <p:cNvPr id="25" name="Elbow Connector 24"/>
+          <p:cNvCxnSpPr/>
+          <p:nvPr/>
+        </p:nvCxnSpPr>
+        <p:spPr>
+          <a:xfrm rot="5400000">
+            <a:off x="3139011" y="7585759"/>
+            <a:ext cx="795146" cy="2012273"/>
+          </a:xfrm>
+          <a:prstGeom prst="bentConnector3">
+            <a:avLst>
+              <a:gd name="adj1" fmla="val 50000"/>
+            </a:avLst>
+          </a:prstGeom>
+          <a:ln>
+            <a:tailEnd type="triangle"/>
+          </a:ln>
+        </p:spPr>
+        <p:style>
+          <a:lnRef idx="2">
+            <a:schemeClr val="accent1"/>
+          </a:lnRef>
+          <a:fillRef idx="0">
+            <a:schemeClr val="accent1"/>
+          </a:fillRef>
+          <a:effectRef idx="1">
+            <a:schemeClr val="accent1"/>
+          </a:effectRef>
+          <a:fontRef idx="minor">
+            <a:schemeClr val="tx1"/>
+          </a:fontRef>
+        </p:style>
+      </p:cxnSp>
+      <p:sp>
+        <p:nvSpPr>
+          <p:cNvPr id="26" name="TextBox 25"/>
+          <p:cNvSpPr txBox="1"/>
+          <p:nvPr/>
+        </p:nvSpPr>
+        <p:spPr>
+          <a:xfrm>
+            <a:off x="4538112" y="8222428"/>
+            <a:ext cx="1226361" cy="369332"/>
+          </a:xfrm>
+          <a:prstGeom prst="rect">
+            <a:avLst/>
+          </a:prstGeom>
+          <a:noFill/>
+        </p:spPr>
+        <p:txBody>
+          <a:bodyPr wrap="none" rtlCol="0">
+            <a:spAutoFit/>
+          </a:bodyPr>
+          <a:lstStyle/>
+          <a:p>
+            <a:r>
+              <a:rPr lang="en-US" smtClean="0"/>
+              <a:t>Summarize</a:t>
+            </a:r>
+            <a:endParaRPr lang="en-US"/>
+          </a:p>
+        </p:txBody>
+      </p:sp>
+      <p:cxnSp>
+        <p:nvCxnSpPr>
+          <p:cNvPr id="27" name="Elbow Connector 26"/>
+          <p:cNvCxnSpPr/>
+          <p:nvPr/>
+        </p:nvCxnSpPr>
+        <p:spPr>
+          <a:xfrm rot="16200000" flipH="1">
+            <a:off x="5405829" y="7331212"/>
+            <a:ext cx="662222" cy="2388441"/>
+          </a:xfrm>
+          <a:prstGeom prst="bentConnector3">
+            <a:avLst>
+              <a:gd name="adj1" fmla="val 59589"/>
+            </a:avLst>
+          </a:prstGeom>
+          <a:ln>
+            <a:tailEnd type="triangle"/>
+          </a:ln>
+        </p:spPr>
+        <p:style>
+          <a:lnRef idx="2">
+            <a:schemeClr val="accent1"/>
+          </a:lnRef>
+          <a:fillRef idx="0">
+            <a:schemeClr val="accent1"/>
+          </a:fillRef>
+          <a:effectRef idx="1">
+            <a:schemeClr val="accent1"/>
+          </a:effectRef>
+          <a:fontRef idx="minor">
+            <a:schemeClr val="tx1"/>
+          </a:fontRef>
+        </p:style>
+      </p:cxnSp>
+      <p:cxnSp>
+        <p:nvCxnSpPr>
+          <p:cNvPr id="29" name="Straight Arrow Connector 28"/>
+          <p:cNvCxnSpPr>
+            <a:stCxn id="5" idx="2"/>
+            <a:endCxn id="18" idx="0"/>
+          </p:cNvCxnSpPr>
+          <p:nvPr/>
+        </p:nvCxnSpPr>
+        <p:spPr>
+          <a:xfrm>
+            <a:off x="4542719" y="3008628"/>
+            <a:ext cx="0" cy="2452977"/>
+          </a:xfrm>
+          <a:prstGeom prst="straightConnector1">
+            <a:avLst/>
+          </a:prstGeom>
+          <a:ln>
+            <a:tailEnd type="triangle"/>
+          </a:ln>
+        </p:spPr>
+        <p:style>
+          <a:lnRef idx="2">
+            <a:schemeClr val="accent1"/>
+          </a:lnRef>
+          <a:fillRef idx="0">
+            <a:schemeClr val="accent1"/>
+          </a:fillRef>
+          <a:effectRef idx="1">
+            <a:schemeClr val="accent1"/>
+          </a:effectRef>
+          <a:fontRef idx="minor">
+            <a:schemeClr val="tx1"/>
+          </a:fontRef>
+        </p:style>
+      </p:cxnSp>
+      <p:sp>
+        <p:nvSpPr>
+          <p:cNvPr id="30" name="TextBox 29"/>
+          <p:cNvSpPr txBox="1"/>
+          <p:nvPr/>
+        </p:nvSpPr>
+        <p:spPr>
+          <a:xfrm>
+            <a:off x="458071" y="5396324"/>
+            <a:ext cx="1928836" cy="646331"/>
+          </a:xfrm>
+          <a:prstGeom prst="rect">
+            <a:avLst/>
+          </a:prstGeom>
+        </p:spPr>
+        <p:style>
+          <a:lnRef idx="2">
+            <a:schemeClr val="accent1"/>
+          </a:lnRef>
+          <a:fillRef idx="1">
+            <a:schemeClr val="lt1"/>
+          </a:fillRef>
+          <a:effectRef idx="0">
+            <a:schemeClr val="accent1"/>
+          </a:effectRef>
+          <a:fontRef idx="minor">
+            <a:schemeClr val="dk1"/>
+          </a:fontRef>
+        </p:style>
+        <p:txBody>
+          <a:bodyPr wrap="square" rtlCol="0">
+            <a:spAutoFit/>
+          </a:bodyPr>
+          <a:lstStyle/>
+          <a:p>
+            <a:pPr algn="ctr"/>
+            <a:r>
+              <a:rPr lang="en-US" dirty="0" smtClean="0"/>
+              <a:t>Protein-Protein Interactions</a:t>
+            </a:r>
+            <a:endParaRPr lang="en-US" dirty="0"/>
+          </a:p>
+        </p:txBody>
+      </p:sp>
+      <p:sp>
+        <p:nvSpPr>
+          <p:cNvPr id="31" name="TextBox 30"/>
+          <p:cNvSpPr txBox="1"/>
+          <p:nvPr/>
+        </p:nvSpPr>
+        <p:spPr>
+          <a:xfrm>
+            <a:off x="6522859" y="5461604"/>
+            <a:ext cx="1928836" cy="646331"/>
+          </a:xfrm>
+          <a:prstGeom prst="rect">
+            <a:avLst/>
+          </a:prstGeom>
+        </p:spPr>
+        <p:style>
+          <a:lnRef idx="2">
+            <a:schemeClr val="accent1"/>
+          </a:lnRef>
+          <a:fillRef idx="1">
+            <a:schemeClr val="lt1"/>
+          </a:fillRef>
+          <a:effectRef idx="0">
+            <a:schemeClr val="accent1"/>
+          </a:effectRef>
+          <a:fontRef idx="minor">
+            <a:schemeClr val="dk1"/>
+          </a:fontRef>
+        </p:style>
+        <p:txBody>
+          <a:bodyPr wrap="square" rtlCol="0">
+            <a:spAutoFit/>
+          </a:bodyPr>
+          <a:lstStyle/>
+          <a:p>
+            <a:pPr algn="ctr"/>
+            <a:r>
+              <a:rPr lang="en-US" dirty="0" smtClean="0"/>
+              <a:t>Protein-Chemical Interactions</a:t>
+            </a:r>
+            <a:endParaRPr lang="en-US" dirty="0"/>
+          </a:p>
+        </p:txBody>
+      </p:sp>
+      <p:sp>
+        <p:nvSpPr>
+          <p:cNvPr id="32" name="TextBox 31"/>
+          <p:cNvSpPr txBox="1"/>
+          <p:nvPr/>
+        </p:nvSpPr>
+        <p:spPr>
+          <a:xfrm>
+            <a:off x="458071" y="3140427"/>
+            <a:ext cx="1928836" cy="646331"/>
+          </a:xfrm>
+          <a:prstGeom prst="rect">
+            <a:avLst/>
+          </a:prstGeom>
+        </p:spPr>
+        <p:style>
+          <a:lnRef idx="2">
+            <a:schemeClr val="accent1"/>
+          </a:lnRef>
+          <a:fillRef idx="1">
+            <a:schemeClr val="lt1"/>
+          </a:fillRef>
+          <a:effectRef idx="0">
+            <a:schemeClr val="accent1"/>
+          </a:effectRef>
+          <a:fontRef idx="minor">
+            <a:schemeClr val="dk1"/>
+          </a:fontRef>
+        </p:style>
+        <p:txBody>
+          <a:bodyPr wrap="square" rtlCol="0">
+            <a:spAutoFit/>
+          </a:bodyPr>
+          <a:lstStyle/>
+          <a:p>
+            <a:pPr algn="ctr"/>
+            <a:r>
+              <a:rPr lang="en-US" dirty="0" smtClean="0"/>
+              <a:t>Interactome3d (pre-build)</a:t>
+            </a:r>
+            <a:endParaRPr lang="en-US" dirty="0"/>
+          </a:p>
+        </p:txBody>
+      </p:sp>
+      <p:sp>
+        <p:nvSpPr>
+          <p:cNvPr id="33" name="TextBox 32"/>
+          <p:cNvSpPr txBox="1"/>
+          <p:nvPr/>
+        </p:nvSpPr>
+        <p:spPr>
+          <a:xfrm>
+            <a:off x="6984037" y="3278926"/>
+            <a:ext cx="1467658" cy="369332"/>
+          </a:xfrm>
+          <a:prstGeom prst="rect">
+            <a:avLst/>
+          </a:prstGeom>
+        </p:spPr>
+        <p:style>
+          <a:lnRef idx="2">
+            <a:schemeClr val="accent1"/>
+          </a:lnRef>
+          <a:fillRef idx="1">
+            <a:schemeClr val="lt1"/>
+          </a:fillRef>
+          <a:effectRef idx="0">
+            <a:schemeClr val="accent1"/>
+          </a:effectRef>
+          <a:fontRef idx="minor">
+            <a:schemeClr val="dk1"/>
+          </a:fontRef>
+        </p:style>
+        <p:txBody>
+          <a:bodyPr wrap="square" rtlCol="0">
+            <a:spAutoFit/>
+          </a:bodyPr>
+          <a:lstStyle/>
+          <a:p>
+            <a:pPr algn="ctr"/>
+            <a:r>
+              <a:rPr lang="en-US" dirty="0" err="1" smtClean="0"/>
+              <a:t>BioLiP</a:t>
+            </a:r>
+            <a:endParaRPr lang="en-US" dirty="0"/>
+          </a:p>
+        </p:txBody>
+      </p:sp>
+      <p:sp>
+        <p:nvSpPr>
+          <p:cNvPr id="34" name="TextBox 33"/>
+          <p:cNvSpPr txBox="1"/>
+          <p:nvPr/>
+        </p:nvSpPr>
+        <p:spPr>
+          <a:xfrm>
+            <a:off x="458071" y="4075653"/>
+            <a:ext cx="1928836" cy="923330"/>
+          </a:xfrm>
+          <a:prstGeom prst="rect">
+            <a:avLst/>
+          </a:prstGeom>
+        </p:spPr>
+        <p:style>
+          <a:lnRef idx="2">
+            <a:schemeClr val="accent1"/>
+          </a:lnRef>
+          <a:fillRef idx="1">
+            <a:schemeClr val="lt1"/>
+          </a:fillRef>
+          <a:effectRef idx="0">
+            <a:schemeClr val="accent1"/>
+          </a:effectRef>
+          <a:fontRef idx="minor">
+            <a:schemeClr val="dk1"/>
+          </a:fontRef>
+        </p:style>
+        <p:txBody>
+          <a:bodyPr wrap="square" rtlCol="0">
+            <a:spAutoFit/>
+          </a:bodyPr>
+          <a:lstStyle/>
+          <a:p>
+            <a:pPr algn="ctr"/>
+            <a:r>
+              <a:rPr lang="en-US" dirty="0" smtClean="0"/>
+              <a:t>Domain-domain interactions (e.g. Gene3)</a:t>
+            </a:r>
+            <a:endParaRPr lang="en-US" dirty="0"/>
+          </a:p>
+        </p:txBody>
+      </p:sp>
+      <p:cxnSp>
+        <p:nvCxnSpPr>
+          <p:cNvPr id="38" name="Straight Connector 37"/>
+          <p:cNvCxnSpPr>
+            <a:stCxn id="32" idx="3"/>
+          </p:cNvCxnSpPr>
+          <p:nvPr/>
+        </p:nvCxnSpPr>
+        <p:spPr>
+          <a:xfrm flipV="1">
+            <a:off x="2386907" y="3463592"/>
+            <a:ext cx="2151205" cy="1"/>
+          </a:xfrm>
+          <a:prstGeom prst="line">
+            <a:avLst/>
+          </a:prstGeom>
+        </p:spPr>
+        <p:style>
+          <a:lnRef idx="2">
+            <a:schemeClr val="accent1"/>
+          </a:lnRef>
+          <a:fillRef idx="0">
+            <a:schemeClr val="accent1"/>
+          </a:fillRef>
+          <a:effectRef idx="1">
+            <a:schemeClr val="accent1"/>
+          </a:effectRef>
+          <a:fontRef idx="minor">
+            <a:schemeClr val="tx1"/>
+          </a:fontRef>
+        </p:style>
+      </p:cxnSp>
+      <p:cxnSp>
+        <p:nvCxnSpPr>
+          <p:cNvPr id="40" name="Straight Connector 39"/>
+          <p:cNvCxnSpPr>
+            <a:stCxn id="34" idx="3"/>
+          </p:cNvCxnSpPr>
+          <p:nvPr/>
+        </p:nvCxnSpPr>
+        <p:spPr>
+          <a:xfrm>
+            <a:off x="2386907" y="4537318"/>
+            <a:ext cx="2151205" cy="0"/>
+          </a:xfrm>
+          <a:prstGeom prst="line">
+            <a:avLst/>
+          </a:prstGeom>
+        </p:spPr>
+        <p:style>
+          <a:lnRef idx="2">
+            <a:schemeClr val="accent1"/>
+          </a:lnRef>
+          <a:fillRef idx="0">
+            <a:schemeClr val="accent1"/>
+          </a:fillRef>
+          <a:effectRef idx="1">
+            <a:schemeClr val="accent1"/>
+          </a:effectRef>
+          <a:fontRef idx="minor">
+            <a:schemeClr val="tx1"/>
+          </a:fontRef>
+        </p:style>
+      </p:cxnSp>
+      <p:cxnSp>
+        <p:nvCxnSpPr>
+          <p:cNvPr id="42" name="Straight Connector 41"/>
+          <p:cNvCxnSpPr>
+            <a:stCxn id="33" idx="1"/>
+          </p:cNvCxnSpPr>
+          <p:nvPr/>
+        </p:nvCxnSpPr>
+        <p:spPr>
+          <a:xfrm flipH="1">
+            <a:off x="4538112" y="3463592"/>
+            <a:ext cx="2445925" cy="0"/>
+          </a:xfrm>
+          <a:prstGeom prst="line">
+            <a:avLst/>
+          </a:prstGeom>
+        </p:spPr>
+        <p:style>
+          <a:lnRef idx="2">
+            <a:schemeClr val="accent1"/>
+          </a:lnRef>
+          <a:fillRef idx="0">
+            <a:schemeClr val="accent1"/>
+          </a:fillRef>
+          <a:effectRef idx="1">
+            <a:schemeClr val="accent1"/>
+          </a:effectRef>
+          <a:fontRef idx="minor">
+            <a:schemeClr val="tx1"/>
+          </a:fontRef>
+        </p:style>
+      </p:cxnSp>
+      <p:sp>
+        <p:nvSpPr>
+          <p:cNvPr id="43" name="TextBox 42"/>
+          <p:cNvSpPr txBox="1"/>
+          <p:nvPr/>
+        </p:nvSpPr>
+        <p:spPr>
+          <a:xfrm>
+            <a:off x="4538112" y="4769108"/>
+            <a:ext cx="2659702" cy="369332"/>
+          </a:xfrm>
+          <a:prstGeom prst="rect">
+            <a:avLst/>
+          </a:prstGeom>
+          <a:noFill/>
+        </p:spPr>
+        <p:txBody>
+          <a:bodyPr wrap="none" rtlCol="0">
+            <a:spAutoFit/>
+          </a:bodyPr>
+          <a:lstStyle/>
+          <a:p>
+            <a:r>
+              <a:rPr lang="en-US" dirty="0" smtClean="0"/>
+              <a:t>Mutation location analysis</a:t>
+            </a:r>
+            <a:endParaRPr lang="en-US" dirty="0"/>
+          </a:p>
+        </p:txBody>
+      </p:sp>
+      <p:cxnSp>
+        <p:nvCxnSpPr>
+          <p:cNvPr id="45" name="Elbow Connector 44"/>
+          <p:cNvCxnSpPr>
+            <a:stCxn id="30" idx="2"/>
+          </p:cNvCxnSpPr>
+          <p:nvPr/>
+        </p:nvCxnSpPr>
+        <p:spPr>
+          <a:xfrm rot="16200000" flipH="1">
+            <a:off x="2850649" y="4614494"/>
+            <a:ext cx="259302" cy="3115623"/>
+          </a:xfrm>
+          <a:prstGeom prst="bentConnector2">
+            <a:avLst/>
+          </a:prstGeom>
+        </p:spPr>
+        <p:style>
+          <a:lnRef idx="2">
+            <a:schemeClr val="accent1"/>
+          </a:lnRef>
+          <a:fillRef idx="0">
+            <a:schemeClr val="accent1"/>
+          </a:fillRef>
+          <a:effectRef idx="1">
+            <a:schemeClr val="accent1"/>
+          </a:effectRef>
+          <a:fontRef idx="minor">
+            <a:schemeClr val="tx1"/>
+          </a:fontRef>
+        </p:style>
+      </p:cxnSp>
+      <p:cxnSp>
+        <p:nvCxnSpPr>
+          <p:cNvPr id="49" name="Elbow Connector 48"/>
+          <p:cNvCxnSpPr>
+            <a:stCxn id="31" idx="2"/>
+          </p:cNvCxnSpPr>
+          <p:nvPr/>
+        </p:nvCxnSpPr>
+        <p:spPr>
+          <a:xfrm rot="5400000">
+            <a:off x="5915684" y="4730364"/>
+            <a:ext cx="194022" cy="2949165"/>
+          </a:xfrm>
+          <a:prstGeom prst="bentConnector2">
+            <a:avLst/>
+          </a:prstGeom>
+        </p:spPr>
+        <p:style>
+          <a:lnRef idx="2">
+            <a:schemeClr val="accent1"/>
+          </a:lnRef>
+          <a:fillRef idx="0">
+            <a:schemeClr val="accent1"/>
+          </a:fillRef>
+          <a:effectRef idx="1">
+            <a:schemeClr val="accent1"/>
+          </a:effectRef>
+          <a:fontRef idx="minor">
+            <a:schemeClr val="tx1"/>
+          </a:fontRef>
+        </p:style>
+      </p:cxnSp>
+      <p:sp>
+        <p:nvSpPr>
+          <p:cNvPr id="50" name="TextBox 49"/>
+          <p:cNvSpPr txBox="1"/>
+          <p:nvPr/>
+        </p:nvSpPr>
+        <p:spPr>
+          <a:xfrm>
+            <a:off x="204833" y="10384318"/>
+            <a:ext cx="8666557" cy="2585323"/>
+          </a:xfrm>
+          <a:prstGeom prst="rect">
+            <a:avLst/>
+          </a:prstGeom>
+          <a:noFill/>
+        </p:spPr>
+        <p:txBody>
+          <a:bodyPr wrap="square" rtlCol="0">
+            <a:spAutoFit/>
+          </a:bodyPr>
+          <a:lstStyle/>
+          <a:p>
+            <a:r>
+              <a:rPr lang="en-US" dirty="0" smtClean="0"/>
+              <a:t>Notes: 1). </a:t>
+            </a:r>
+            <a:r>
+              <a:rPr lang="en-US" dirty="0" smtClean="0"/>
+              <a:t>This workflow is used to understand the mechanisms of cancer driver mutations by analyzing interaction interfaces from protein-protein interactions and protein-ligand interactions, impacted reactions, and pathways.</a:t>
+            </a:r>
+            <a:endParaRPr lang="en-US" dirty="0"/>
+          </a:p>
+          <a:p>
+            <a:r>
+              <a:rPr lang="en-US" dirty="0"/>
+              <a:t>	</a:t>
+            </a:r>
+            <a:r>
+              <a:rPr lang="en-US" dirty="0"/>
+              <a:t> </a:t>
+            </a:r>
+            <a:r>
+              <a:rPr lang="en-US" dirty="0" smtClean="0"/>
+              <a:t>   2). The workflow has not tried to get a list of impacted reactions or pathways for one or more cancer types since this is not possible based on the current number of known PPI structures. The focus here is what will happen if a cell has a cancer driver mutation.</a:t>
+            </a:r>
+          </a:p>
+          <a:p>
+            <a:r>
+              <a:rPr lang="en-US" dirty="0" smtClean="0"/>
+              <a:t>             3). Different cancer types may have different sets of mutations, impacting different reactions and pathways. But we cannot exhaust all impacted reactions because of lacking in structures.</a:t>
+            </a:r>
+            <a:endParaRPr lang="en-US" dirty="0" smtClean="0"/>
+          </a:p>
+        </p:txBody>
+      </p:sp>
+    </p:spTree>
+    <p:extLst>
+      <p:ext uri="{BB962C8B-B14F-4D97-AF65-F5344CB8AC3E}">
+        <p14:creationId xmlns:p14="http://schemas.microsoft.com/office/powerpoint/2010/main" val="406535536"/>
+      </p:ext>
+    </p:extLst>
+  </p:cSld>
+  <p:clrMapOvr>
+    <a:masterClrMapping/>
+  </p:clrMapOvr>
 </p:sld>
 </file>
 

</xml_diff>